<commit_message>
final versions of notebook, ppt, README files
</commit_message>
<xml_diff>
--- a/SanchitaGangopadhyay.pptx
+++ b/SanchitaGangopadhyay.pptx
@@ -8009,7 +8009,7 @@
           <a:graphicData uri="http://schemas.openxmlformats.org/presentationml/2006/ole">
             <mc:AlternateContent xmlns:mc="http://schemas.openxmlformats.org/markup-compatibility/2006">
               <mc:Choice xmlns:v="urn:schemas-microsoft-com:vml" Requires="v">
-                <p:oleObj spid="_x0000_s1043" name="Bitmap Image" r:id="rId4" imgW="3360600" imgH="2339280" progId="Paint.Picture">
+                <p:oleObj spid="_x0000_s1060" name="Bitmap Image" r:id="rId4" imgW="3360600" imgH="2339280" progId="Paint.Picture">
                   <p:embed/>
                 </p:oleObj>
               </mc:Choice>
@@ -10032,7 +10032,7 @@
         <p:spPr>
           <a:xfrm>
             <a:off x="170329" y="95205"/>
-            <a:ext cx="5522259" cy="801266"/>
+            <a:ext cx="10408024" cy="801266"/>
           </a:xfrm>
         </p:spPr>
         <p:txBody>
@@ -10043,7 +10043,7 @@
           <a:p>
             <a:r>
               <a:rPr lang="en-US" dirty="0"/>
-              <a:t>recommendations</a:t>
+              <a:t>Analysis &amp; Recommended Guidelines</a:t>
             </a:r>
           </a:p>
         </p:txBody>
@@ -10259,8 +10259,8 @@
         </p:nvSpPr>
         <p:spPr>
           <a:xfrm>
-            <a:off x="170329" y="1261942"/>
-            <a:ext cx="11161059" cy="1077218"/>
+            <a:off x="170329" y="896471"/>
+            <a:ext cx="11161059" cy="2246769"/>
           </a:xfrm>
           <a:prstGeom prst="rect">
             <a:avLst/>
@@ -10272,14 +10272,20 @@
             <a:spAutoFit/>
           </a:bodyPr>
           <a:lstStyle/>
+          <a:p>
+            <a:r>
+              <a:rPr lang="en-IN" sz="1400" dirty="0"/>
+              <a:t>Most important parameters to be considered for analysing default risk:</a:t>
+            </a:r>
+          </a:p>
           <a:p>
             <a:pPr marL="285750" indent="-285750">
               <a:buFont typeface="Arial" panose="020B0604020202020204" pitchFamily="34" charset="0"/>
               <a:buChar char="•"/>
             </a:pPr>
             <a:r>
-              <a:rPr lang="en-IN" sz="1600" dirty="0"/>
-              <a:t>Caution to be taken while approving loan application for customers with employment length less than five years</a:t>
+              <a:rPr lang="en-IN" sz="1400" dirty="0"/>
+              <a:t>Length of employment</a:t>
             </a:r>
           </a:p>
           <a:p>
@@ -10288,8 +10294,8 @@
               <a:buChar char="•"/>
             </a:pPr>
             <a:r>
-              <a:rPr lang="en-IN" sz="1600" dirty="0"/>
-              <a:t>Recommendation guideline on loan amount across employment length and income buckets</a:t>
+              <a:rPr lang="en-IN" sz="1400" dirty="0"/>
+              <a:t>Annual income</a:t>
             </a:r>
           </a:p>
           <a:p>
@@ -10297,23 +10303,221 @@
               <a:buFont typeface="Arial" panose="020B0604020202020204" pitchFamily="34" charset="0"/>
               <a:buChar char="•"/>
             </a:pPr>
-            <a:endParaRPr lang="en-IN" sz="1600" dirty="0"/>
+            <a:r>
+              <a:rPr lang="en-IN" sz="1400" dirty="0"/>
+              <a:t>Debt to income ratio</a:t>
+            </a:r>
           </a:p>
           <a:p>
             <a:pPr marL="285750" indent="-285750">
               <a:buFont typeface="Arial" panose="020B0604020202020204" pitchFamily="34" charset="0"/>
               <a:buChar char="•"/>
             </a:pPr>
-            <a:endParaRPr lang="en-IN" sz="1600" dirty="0"/>
+            <a:r>
+              <a:rPr lang="en-IN" sz="1400" dirty="0"/>
+              <a:t>Employer reputation</a:t>
+            </a:r>
+          </a:p>
+          <a:p>
+            <a:pPr marL="285750" indent="-285750">
+              <a:buFont typeface="Arial" panose="020B0604020202020204" pitchFamily="34" charset="0"/>
+              <a:buChar char="•"/>
+            </a:pPr>
+            <a:r>
+              <a:rPr lang="en-IN" sz="1400" dirty="0"/>
+              <a:t>Requested loan amount</a:t>
+            </a:r>
+          </a:p>
+          <a:p>
+            <a:pPr marL="285750" indent="-285750">
+              <a:buFont typeface="Arial" panose="020B0604020202020204" pitchFamily="34" charset="0"/>
+              <a:buChar char="•"/>
+            </a:pPr>
+            <a:r>
+              <a:rPr lang="en-IN" sz="1400" dirty="0"/>
+              <a:t>Employment verification</a:t>
+            </a:r>
+          </a:p>
+          <a:p>
+            <a:pPr marL="285750" indent="-285750">
+              <a:buFont typeface="Arial" panose="020B0604020202020204" pitchFamily="34" charset="0"/>
+              <a:buChar char="•"/>
+            </a:pPr>
+            <a:endParaRPr lang="en-IN" sz="1400" dirty="0"/>
+          </a:p>
+          <a:p>
+            <a:pPr marL="285750" indent="-285750">
+              <a:buFont typeface="Arial" panose="020B0604020202020204" pitchFamily="34" charset="0"/>
+              <a:buChar char="•"/>
+            </a:pPr>
+            <a:endParaRPr lang="en-IN" sz="1400" dirty="0"/>
+          </a:p>
+          <a:p>
+            <a:pPr marL="285750" indent="-285750">
+              <a:buFont typeface="Arial" panose="020B0604020202020204" pitchFamily="34" charset="0"/>
+              <a:buChar char="•"/>
+            </a:pPr>
+            <a:endParaRPr lang="en-IN" sz="1400" dirty="0"/>
+          </a:p>
+        </p:txBody>
+      </p:sp>
+      <p:sp>
+        <p:nvSpPr>
+          <p:cNvPr id="10" name="TextBox 9">
+            <a:extLst>
+              <a:ext uri="{FF2B5EF4-FFF2-40B4-BE49-F238E27FC236}">
+                <a16:creationId xmlns:a16="http://schemas.microsoft.com/office/drawing/2014/main" id="{702FC231-9ECE-48BB-83DC-3D6126CCC6AD}"/>
+              </a:ext>
+            </a:extLst>
+          </p:cNvPr>
+          <p:cNvSpPr txBox="1"/>
+          <p:nvPr/>
+        </p:nvSpPr>
+        <p:spPr>
+          <a:xfrm>
+            <a:off x="170328" y="3283007"/>
+            <a:ext cx="11161059" cy="3323987"/>
+          </a:xfrm>
+          <a:prstGeom prst="rect">
+            <a:avLst/>
+          </a:prstGeom>
+          <a:noFill/>
+        </p:spPr>
+        <p:txBody>
+          <a:bodyPr wrap="square">
+            <a:spAutoFit/>
+          </a:bodyPr>
+          <a:lstStyle/>
+          <a:p>
+            <a:r>
+              <a:rPr lang="en-IN" sz="1400" dirty="0"/>
+              <a:t>Guidelines for loan approvals:</a:t>
+            </a:r>
+          </a:p>
+          <a:p>
+            <a:pPr marL="285750" indent="-285750">
+              <a:buFont typeface="Arial" panose="020B0604020202020204" pitchFamily="34" charset="0"/>
+              <a:buChar char="•"/>
+            </a:pPr>
+            <a:r>
+              <a:rPr lang="en-IN" sz="1400" dirty="0"/>
+              <a:t>Exercise caution while approving loan application for customers with employment length less than five years</a:t>
+            </a:r>
+          </a:p>
+          <a:p>
+            <a:pPr marL="285750" indent="-285750">
+              <a:buFont typeface="Arial" panose="020B0604020202020204" pitchFamily="34" charset="0"/>
+              <a:buChar char="•"/>
+            </a:pPr>
+            <a:endParaRPr lang="en-IN" sz="1400" dirty="0"/>
+          </a:p>
+          <a:p>
+            <a:pPr marL="285750" indent="-285750">
+              <a:buFont typeface="Arial" panose="020B0604020202020204" pitchFamily="34" charset="0"/>
+              <a:buChar char="•"/>
+            </a:pPr>
+            <a:r>
+              <a:rPr lang="en-IN" sz="1400" dirty="0"/>
+              <a:t>Refer to Table – 1 for recommended guideline on loan amount across employment length and income buckets</a:t>
+            </a:r>
+          </a:p>
+          <a:p>
+            <a:pPr marL="285750" indent="-285750">
+              <a:buFont typeface="Arial" panose="020B0604020202020204" pitchFamily="34" charset="0"/>
+              <a:buChar char="•"/>
+            </a:pPr>
+            <a:endParaRPr lang="en-IN" sz="1400" dirty="0"/>
+          </a:p>
+          <a:p>
+            <a:pPr marL="285750" indent="-285750">
+              <a:buFont typeface="Arial" panose="020B0604020202020204" pitchFamily="34" charset="0"/>
+              <a:buChar char="•"/>
+            </a:pPr>
+            <a:r>
+              <a:rPr lang="en-IN" sz="1400" dirty="0"/>
+              <a:t>In case requested funding amount is considerably more than the recommended levels, consider it to be a risk</a:t>
+            </a:r>
+          </a:p>
+          <a:p>
+            <a:pPr marL="285750" indent="-285750">
+              <a:buFont typeface="Arial" panose="020B0604020202020204" pitchFamily="34" charset="0"/>
+              <a:buChar char="•"/>
+            </a:pPr>
+            <a:endParaRPr lang="en-IN" sz="1400" dirty="0"/>
+          </a:p>
+          <a:p>
+            <a:pPr marL="285750" indent="-285750">
+              <a:buFont typeface="Arial" panose="020B0604020202020204" pitchFamily="34" charset="0"/>
+              <a:buChar char="•"/>
+            </a:pPr>
+            <a:r>
+              <a:rPr lang="en-IN" sz="1400" dirty="0"/>
+              <a:t>Rigorous verification of employment/source of income to be done for all loan applications</a:t>
+            </a:r>
+          </a:p>
+          <a:p>
+            <a:pPr marL="285750" indent="-285750">
+              <a:buFont typeface="Arial" panose="020B0604020202020204" pitchFamily="34" charset="0"/>
+              <a:buChar char="•"/>
+            </a:pPr>
+            <a:endParaRPr lang="en-IN" sz="1400" dirty="0"/>
+          </a:p>
+          <a:p>
+            <a:pPr marL="285750" indent="-285750">
+              <a:buFont typeface="Arial" panose="020B0604020202020204" pitchFamily="34" charset="0"/>
+              <a:buChar char="•"/>
+            </a:pPr>
+            <a:r>
+              <a:rPr lang="en-IN" sz="1400" dirty="0"/>
+              <a:t>Consider raising interest rate by 5% for mid and high income group customers seeking 36 months of term</a:t>
+            </a:r>
+          </a:p>
+          <a:p>
+            <a:pPr marL="285750" indent="-285750">
+              <a:buFont typeface="Arial" panose="020B0604020202020204" pitchFamily="34" charset="0"/>
+              <a:buChar char="•"/>
+            </a:pPr>
+            <a:endParaRPr lang="en-IN" sz="1400" dirty="0"/>
+          </a:p>
+          <a:p>
+            <a:pPr marL="285750" indent="-285750">
+              <a:buFont typeface="Arial" panose="020B0604020202020204" pitchFamily="34" charset="0"/>
+              <a:buChar char="•"/>
+            </a:pPr>
+            <a:r>
+              <a:rPr lang="en-IN" sz="1400" dirty="0"/>
+              <a:t>Employer reputation and job stability to be considered</a:t>
+            </a:r>
+          </a:p>
+          <a:p>
+            <a:pPr marL="285750" indent="-285750">
+              <a:buFont typeface="Arial" panose="020B0604020202020204" pitchFamily="34" charset="0"/>
+              <a:buChar char="•"/>
+            </a:pPr>
+            <a:endParaRPr lang="en-IN" sz="1400" dirty="0"/>
+          </a:p>
+          <a:p>
+            <a:pPr marL="285750" indent="-285750">
+              <a:buFont typeface="Arial" panose="020B0604020202020204" pitchFamily="34" charset="0"/>
+              <a:buChar char="•"/>
+            </a:pPr>
+            <a:endParaRPr lang="en-IN" sz="1400" dirty="0"/>
+          </a:p>
+          <a:p>
+            <a:pPr marL="285750" indent="-285750">
+              <a:buFont typeface="Arial" panose="020B0604020202020204" pitchFamily="34" charset="0"/>
+              <a:buChar char="•"/>
+            </a:pPr>
+            <a:endParaRPr lang="en-IN" sz="1400" dirty="0"/>
           </a:p>
         </p:txBody>
       </p:sp>
       <p:pic>
         <p:nvPicPr>
-          <p:cNvPr id="4" name="Picture 3">
-            <a:extLst>
-              <a:ext uri="{FF2B5EF4-FFF2-40B4-BE49-F238E27FC236}">
-                <a16:creationId xmlns:a16="http://schemas.microsoft.com/office/drawing/2014/main" id="{A4326CC4-C0C0-44BE-841D-5ED181796ACB}"/>
+          <p:cNvPr id="12" name="Picture 11">
+            <a:extLst>
+              <a:ext uri="{FF2B5EF4-FFF2-40B4-BE49-F238E27FC236}">
+                <a16:creationId xmlns:a16="http://schemas.microsoft.com/office/drawing/2014/main" id="{E7517427-6E6D-4C2B-9F09-589FA9FB8CAB}"/>
               </a:ext>
             </a:extLst>
           </p:cNvPr>
@@ -10330,7 +10534,7 @@
         </p:blipFill>
         <p:spPr>
           <a:xfrm>
-            <a:off x="1323498" y="2144930"/>
+            <a:off x="8558018" y="1167775"/>
             <a:ext cx="3215919" cy="2263336"/>
           </a:xfrm>
           <a:prstGeom prst="rect">
@@ -10340,10 +10544,10 @@
       </p:pic>
       <p:sp>
         <p:nvSpPr>
-          <p:cNvPr id="13" name="TextBox 12">
-            <a:extLst>
-              <a:ext uri="{FF2B5EF4-FFF2-40B4-BE49-F238E27FC236}">
-                <a16:creationId xmlns:a16="http://schemas.microsoft.com/office/drawing/2014/main" id="{DAEB4E6F-FE1A-43B5-8412-5E58B7BD6F07}"/>
+          <p:cNvPr id="14" name="TextBox 13">
+            <a:extLst>
+              <a:ext uri="{FF2B5EF4-FFF2-40B4-BE49-F238E27FC236}">
+                <a16:creationId xmlns:a16="http://schemas.microsoft.com/office/drawing/2014/main" id="{E67F369B-6C9C-4941-B978-FDC359E95E0B}"/>
               </a:ext>
             </a:extLst>
           </p:cNvPr>
@@ -10352,7 +10556,7 @@
         </p:nvSpPr>
         <p:spPr>
           <a:xfrm>
-            <a:off x="1323499" y="1864959"/>
+            <a:off x="8558019" y="887804"/>
             <a:ext cx="1141795" cy="214850"/>
           </a:xfrm>
           <a:prstGeom prst="rect">
@@ -10381,10 +10585,10 @@
       </p:sp>
       <p:sp>
         <p:nvSpPr>
-          <p:cNvPr id="15" name="TextBox 14">
-            <a:extLst>
-              <a:ext uri="{FF2B5EF4-FFF2-40B4-BE49-F238E27FC236}">
-                <a16:creationId xmlns:a16="http://schemas.microsoft.com/office/drawing/2014/main" id="{608C7B34-C931-4842-B280-4CF51C7D764B}"/>
+          <p:cNvPr id="17" name="TextBox 16">
+            <a:extLst>
+              <a:ext uri="{FF2B5EF4-FFF2-40B4-BE49-F238E27FC236}">
+                <a16:creationId xmlns:a16="http://schemas.microsoft.com/office/drawing/2014/main" id="{98EDDA98-7F85-4E7C-B2CF-C6EC1A590D63}"/>
               </a:ext>
             </a:extLst>
           </p:cNvPr>
@@ -10393,7 +10597,7 @@
         </p:nvSpPr>
         <p:spPr>
           <a:xfrm>
-            <a:off x="2587523" y="1864959"/>
+            <a:off x="9822043" y="887804"/>
             <a:ext cx="1141795" cy="214850"/>
           </a:xfrm>
           <a:prstGeom prst="rect">
@@ -10422,10 +10626,10 @@
       </p:sp>
       <p:sp>
         <p:nvSpPr>
-          <p:cNvPr id="16" name="TextBox 15">
-            <a:extLst>
-              <a:ext uri="{FF2B5EF4-FFF2-40B4-BE49-F238E27FC236}">
-                <a16:creationId xmlns:a16="http://schemas.microsoft.com/office/drawing/2014/main" id="{AEA33A81-D572-477B-BD89-FD6D6EF291B7}"/>
+          <p:cNvPr id="20" name="TextBox 19">
+            <a:extLst>
+              <a:ext uri="{FF2B5EF4-FFF2-40B4-BE49-F238E27FC236}">
+                <a16:creationId xmlns:a16="http://schemas.microsoft.com/office/drawing/2014/main" id="{C66CA1C8-9636-4896-BE28-B8D8348984D3}"/>
               </a:ext>
             </a:extLst>
           </p:cNvPr>
@@ -10434,7 +10638,7 @@
         </p:nvSpPr>
         <p:spPr>
           <a:xfrm>
-            <a:off x="3645359" y="1809642"/>
+            <a:off x="10879879" y="832487"/>
             <a:ext cx="1141795" cy="338554"/>
           </a:xfrm>
           <a:prstGeom prst="rect">
@@ -10463,10 +10667,10 @@
       </p:sp>
       <p:sp>
         <p:nvSpPr>
-          <p:cNvPr id="19" name="TextBox 18">
-            <a:extLst>
-              <a:ext uri="{FF2B5EF4-FFF2-40B4-BE49-F238E27FC236}">
-                <a16:creationId xmlns:a16="http://schemas.microsoft.com/office/drawing/2014/main" id="{C3F06915-C5EF-44C6-ADD5-B859C5C5017F}"/>
+          <p:cNvPr id="21" name="TextBox 20">
+            <a:extLst>
+              <a:ext uri="{FF2B5EF4-FFF2-40B4-BE49-F238E27FC236}">
+                <a16:creationId xmlns:a16="http://schemas.microsoft.com/office/drawing/2014/main" id="{08D2BCF8-0FA7-4A9A-B28C-938DB6BA90FA}"/>
               </a:ext>
             </a:extLst>
           </p:cNvPr>
@@ -10475,8 +10679,8 @@
         </p:nvSpPr>
         <p:spPr>
           <a:xfrm>
-            <a:off x="295834" y="4498206"/>
-            <a:ext cx="11161059" cy="2062103"/>
+            <a:off x="9902723" y="3505499"/>
+            <a:ext cx="1141795" cy="246221"/>
           </a:xfrm>
           <a:prstGeom prst="rect">
             <a:avLst/>
@@ -10489,65 +10693,22 @@
           </a:bodyPr>
           <a:lstStyle/>
           <a:p>
-            <a:pPr marL="285750" indent="-285750">
-              <a:buFont typeface="Arial" panose="020B0604020202020204" pitchFamily="34" charset="0"/>
-              <a:buChar char="•"/>
-            </a:pPr>
             <a:r>
-              <a:rPr lang="en-IN" sz="1600" dirty="0"/>
-              <a:t>In case requested funding amount is more than the recommended levels, consider collateral based on home ownership and higher interest rate to reduce risk</a:t>
+              <a:rPr lang="en-US" sz="1000" b="1" dirty="0">
+                <a:solidFill>
+                  <a:srgbClr val="000000"/>
+                </a:solidFill>
+                <a:latin typeface="Helvetica Neue"/>
+              </a:rPr>
+              <a:t>Table - 1</a:t>
             </a:r>
-          </a:p>
-          <a:p>
-            <a:pPr marL="285750" indent="-285750">
-              <a:buFont typeface="Arial" panose="020B0604020202020204" pitchFamily="34" charset="0"/>
-              <a:buChar char="•"/>
-            </a:pPr>
-            <a:r>
-              <a:rPr lang="en-IN" sz="1600" dirty="0"/>
-              <a:t>Rigorous verification of employment/source of income to be done for all loan applications</a:t>
-            </a:r>
-          </a:p>
-          <a:p>
-            <a:pPr marL="285750" indent="-285750">
-              <a:buFont typeface="Arial" panose="020B0604020202020204" pitchFamily="34" charset="0"/>
-              <a:buChar char="•"/>
-            </a:pPr>
-            <a:r>
-              <a:rPr lang="en-IN" sz="1600" dirty="0"/>
-              <a:t>Market news on employer regarding job stability to be considered</a:t>
-            </a:r>
-          </a:p>
-          <a:p>
-            <a:pPr marL="285750" indent="-285750">
-              <a:buFont typeface="Arial" panose="020B0604020202020204" pitchFamily="34" charset="0"/>
-              <a:buChar char="•"/>
-            </a:pPr>
-            <a:r>
-              <a:rPr lang="en-IN" sz="1600" dirty="0"/>
-              <a:t>Consider raising interest rates for mid and high income group customers seeking 36 months of term</a:t>
-            </a:r>
-          </a:p>
-          <a:p>
-            <a:pPr marL="285750" indent="-285750">
-              <a:buFont typeface="Arial" panose="020B0604020202020204" pitchFamily="34" charset="0"/>
-              <a:buChar char="•"/>
-            </a:pPr>
-            <a:endParaRPr lang="en-IN" sz="1600" dirty="0"/>
-          </a:p>
-          <a:p>
-            <a:pPr marL="285750" indent="-285750">
-              <a:buFont typeface="Arial" panose="020B0604020202020204" pitchFamily="34" charset="0"/>
-              <a:buChar char="•"/>
-            </a:pPr>
-            <a:endParaRPr lang="en-IN" sz="1600" dirty="0"/>
-          </a:p>
-          <a:p>
-            <a:pPr marL="285750" indent="-285750">
-              <a:buFont typeface="Arial" panose="020B0604020202020204" pitchFamily="34" charset="0"/>
-              <a:buChar char="•"/>
-            </a:pPr>
-            <a:endParaRPr lang="en-IN" sz="1600" dirty="0"/>
+            <a:endParaRPr lang="en-US" sz="1000" b="1" i="0" dirty="0">
+              <a:solidFill>
+                <a:srgbClr val="000000"/>
+              </a:solidFill>
+              <a:effectLst/>
+              <a:latin typeface="Helvetica Neue"/>
+            </a:endParaRPr>
           </a:p>
         </p:txBody>
       </p:sp>

</xml_diff>